<commit_message>
Del3:  seq diagrams, db diagram, tetsing, etc.
</commit_message>
<xml_diff>
--- a/Deliverable3/Deliverable2_PPT_CourseGenie+.pptx
+++ b/Deliverable3/Deliverable2_PPT_CourseGenie+.pptx
@@ -8182,9 +8182,9 @@
               <a:buNone/>
             </a:pPr>
             <a:r>
-              <a:rPr lang="en-US" sz="4600" b="1" i="0" u="none" strike="noStrike" cap="none">
+              <a:rPr lang="en-US" sz="4600" b="1" i="0" u="none" strike="noStrike" cap="none" dirty="0">
                 <a:solidFill>
-                  <a:srgbClr val="00ADEF"/>
+                  <a:srgbClr val="00A7E1"/>
                 </a:solidFill>
                 <a:latin typeface="Ubuntu Condensed"/>
                 <a:ea typeface="Ubuntu Condensed"/>
@@ -8194,9 +8194,9 @@
               <a:t>CourseGenie</a:t>
             </a:r>
             <a:r>
-              <a:rPr lang="en-US" sz="4600" b="1" i="0" u="none" strike="noStrike" cap="none">
+              <a:rPr lang="en-US" sz="4600" b="1" i="0" u="none" strike="noStrike" cap="none" dirty="0">
                 <a:solidFill>
-                  <a:srgbClr val="FFC000"/>
+                  <a:srgbClr val="FFA62B"/>
                 </a:solidFill>
                 <a:latin typeface="Ubuntu Condensed"/>
                 <a:ea typeface="Ubuntu Condensed"/>
@@ -8206,7 +8206,7 @@
               <a:t>+</a:t>
             </a:r>
             <a:r>
-              <a:rPr lang="en-US" sz="4600" b="1" i="0" u="none" strike="noStrike" cap="none">
+              <a:rPr lang="en-US" sz="4600" b="1" i="0" u="none" strike="noStrike" cap="none" dirty="0">
                 <a:solidFill>
                   <a:schemeClr val="dk1"/>
                 </a:solidFill>
@@ -8218,7 +8218,7 @@
               <a:t>:</a:t>
             </a:r>
             <a:r>
-              <a:rPr lang="en-US" sz="4600" b="1" i="0" u="none" strike="noStrike" cap="none">
+              <a:rPr lang="en-US" sz="4600" b="1" i="0" u="none" strike="noStrike" cap="none" dirty="0">
                 <a:solidFill>
                   <a:srgbClr val="00ADEF"/>
                 </a:solidFill>
@@ -8230,7 +8230,7 @@
               <a:t> </a:t>
             </a:r>
             <a:r>
-              <a:rPr lang="en-US" sz="3800" b="1" i="0" u="none" strike="noStrike" cap="none">
+              <a:rPr lang="en-US" sz="3800" b="1" i="0" u="none" strike="noStrike" cap="none" dirty="0">
                 <a:solidFill>
                   <a:schemeClr val="dk1"/>
                 </a:solidFill>
@@ -8241,7 +8241,7 @@
               </a:rPr>
               <a:t>Centralized Academic Workflow Automation</a:t>
             </a:r>
-            <a:endParaRPr sz="3800" b="1" i="0" u="none" strike="noStrike" cap="none">
+            <a:endParaRPr sz="3800" b="1" i="0" u="none" strike="noStrike" cap="none" dirty="0">
               <a:solidFill>
                 <a:schemeClr val="dk1"/>
               </a:solidFill>
@@ -8317,7 +8317,7 @@
               <a:buNone/>
             </a:pPr>
             <a:r>
-              <a:rPr lang="en-US" sz="1400" b="0" i="0" u="none" strike="noStrike" cap="none">
+              <a:rPr lang="en-US" sz="1400" b="0" i="0" u="none" strike="noStrike" cap="none" dirty="0">
                 <a:solidFill>
                   <a:schemeClr val="dk1"/>
                 </a:solidFill>
@@ -8328,7 +8328,7 @@
               </a:rPr>
               <a:t>Team Members: Jeeda Kotob, Ryma Ait Tayeb, Ibraheem Mustafa</a:t>
             </a:r>
-            <a:endParaRPr/>
+            <a:endParaRPr dirty="0"/>
           </a:p>
           <a:p>
             <a:pPr marL="0" marR="0" lvl="0" indent="0" algn="l" rtl="0">
@@ -8344,7 +8344,7 @@
               <a:buNone/>
             </a:pPr>
             <a:r>
-              <a:rPr lang="en-US" sz="1400" b="0" i="0" u="none" strike="noStrike" cap="none">
+              <a:rPr lang="en-US" sz="1400" b="0" i="0" u="none" strike="noStrike" cap="none" dirty="0">
                 <a:solidFill>
                   <a:schemeClr val="dk1"/>
                 </a:solidFill>
@@ -8355,7 +8355,7 @@
               </a:rPr>
               <a:t>Deliverable 2</a:t>
             </a:r>
-            <a:endParaRPr/>
+            <a:endParaRPr dirty="0"/>
           </a:p>
           <a:p>
             <a:pPr marL="0" marR="0" lvl="0" indent="0" algn="l" rtl="0">
@@ -8371,7 +8371,7 @@
               <a:buNone/>
             </a:pPr>
             <a:r>
-              <a:rPr lang="en-US" sz="1400" b="0" i="0" u="none" strike="noStrike" cap="none">
+              <a:rPr lang="en-US" sz="1400" b="0" i="0" u="none" strike="noStrike" cap="none" dirty="0">
                 <a:solidFill>
                   <a:schemeClr val="dk1"/>
                 </a:solidFill>
@@ -8380,9 +8380,33 @@
                 <a:cs typeface="Ubuntu"/>
                 <a:sym typeface="Ubuntu"/>
               </a:rPr>
-              <a:t>Mentors: Dr. Ali Assi &amp; Mr.Qusai Hassan</a:t>
+              <a:t>Mentors: Dr. Ali Assi &amp; </a:t>
             </a:r>
-            <a:endParaRPr/>
+            <a:r>
+              <a:rPr lang="en-US" sz="1400" b="0" i="0" u="none" strike="noStrike" cap="none" dirty="0" err="1">
+                <a:solidFill>
+                  <a:schemeClr val="dk1"/>
+                </a:solidFill>
+                <a:latin typeface="Ubuntu"/>
+                <a:ea typeface="Ubuntu"/>
+                <a:cs typeface="Ubuntu"/>
+                <a:sym typeface="Ubuntu"/>
+              </a:rPr>
+              <a:t>Mr.Qusai</a:t>
+            </a:r>
+            <a:r>
+              <a:rPr lang="en-US" sz="1400" b="0" i="0" u="none" strike="noStrike" cap="none" dirty="0">
+                <a:solidFill>
+                  <a:schemeClr val="dk1"/>
+                </a:solidFill>
+                <a:latin typeface="Ubuntu"/>
+                <a:ea typeface="Ubuntu"/>
+                <a:cs typeface="Ubuntu"/>
+                <a:sym typeface="Ubuntu"/>
+              </a:rPr>
+              <a:t> Hassan</a:t>
+            </a:r>
+            <a:endParaRPr dirty="0"/>
           </a:p>
           <a:p>
             <a:pPr marL="0" marR="0" lvl="0" indent="0" algn="l" rtl="0">
@@ -8398,7 +8422,7 @@
               <a:buNone/>
             </a:pPr>
             <a:r>
-              <a:rPr lang="en-US" sz="1400" b="0" i="0" u="none" strike="noStrike" cap="none">
+              <a:rPr lang="en-US" sz="1400" b="0" i="0" u="none" strike="noStrike" cap="none" dirty="0">
                 <a:solidFill>
                   <a:schemeClr val="dk1"/>
                 </a:solidFill>
@@ -8409,7 +8433,7 @@
               </a:rPr>
               <a:t>November 2025</a:t>
             </a:r>
-            <a:endParaRPr/>
+            <a:endParaRPr dirty="0"/>
           </a:p>
         </p:txBody>
       </p:sp>
@@ -8508,16 +8532,16 @@
               <a:buNone/>
             </a:pPr>
             <a:r>
-              <a:rPr lang="en-US">
+              <a:rPr lang="en-US" dirty="0">
                 <a:solidFill>
-                  <a:schemeClr val="lt2"/>
+                  <a:srgbClr val="024964"/>
                 </a:solidFill>
               </a:rPr>
               <a:t>Project Risk Register</a:t>
             </a:r>
-            <a:endParaRPr>
+            <a:endParaRPr dirty="0">
               <a:solidFill>
-                <a:schemeClr val="lt2"/>
+                <a:srgbClr val="024964"/>
               </a:solidFill>
             </a:endParaRPr>
           </a:p>
@@ -11812,16 +11836,16 @@
               <a:buNone/>
             </a:pPr>
             <a:r>
-              <a:rPr lang="en-US">
+              <a:rPr lang="en-US" dirty="0">
                 <a:solidFill>
-                  <a:schemeClr val="lt2"/>
+                  <a:srgbClr val="024964"/>
                 </a:solidFill>
               </a:rPr>
               <a:t>Resource Planning</a:t>
             </a:r>
-            <a:endParaRPr>
+            <a:endParaRPr dirty="0">
               <a:solidFill>
-                <a:schemeClr val="lt2"/>
+                <a:srgbClr val="024964"/>
               </a:solidFill>
             </a:endParaRPr>
           </a:p>
@@ -11951,16 +11975,16 @@
               <a:buNone/>
             </a:pPr>
             <a:r>
-              <a:rPr lang="en-US">
+              <a:rPr lang="en-US" dirty="0">
                 <a:solidFill>
-                  <a:schemeClr val="lt2"/>
+                  <a:srgbClr val="024964"/>
                 </a:solidFill>
               </a:rPr>
               <a:t>Budget Overview</a:t>
             </a:r>
-            <a:endParaRPr>
+            <a:endParaRPr dirty="0">
               <a:solidFill>
-                <a:schemeClr val="lt2"/>
+                <a:srgbClr val="024964"/>
               </a:solidFill>
             </a:endParaRPr>
           </a:p>
@@ -12286,16 +12310,16 @@
               <a:buNone/>
             </a:pPr>
             <a:r>
-              <a:rPr lang="en-US">
+              <a:rPr lang="en-US" dirty="0">
                 <a:solidFill>
-                  <a:schemeClr val="lt2"/>
+                  <a:srgbClr val="024964"/>
                 </a:solidFill>
               </a:rPr>
               <a:t>Initial Bill of Materials (BoM)</a:t>
             </a:r>
-            <a:endParaRPr>
+            <a:endParaRPr dirty="0">
               <a:solidFill>
-                <a:schemeClr val="lt2"/>
+                <a:srgbClr val="024964"/>
               </a:solidFill>
             </a:endParaRPr>
           </a:p>
@@ -15480,14 +15504,14 @@
             <a:r>
               <a:rPr lang="en-US" dirty="0">
                 <a:solidFill>
-                  <a:schemeClr val="tx2"/>
+                  <a:srgbClr val="024964"/>
                 </a:solidFill>
               </a:rPr>
               <a:t>Test Plan </a:t>
             </a:r>
             <a:endParaRPr dirty="0">
               <a:solidFill>
-                <a:schemeClr val="tx2"/>
+                <a:srgbClr val="024964"/>
               </a:solidFill>
             </a:endParaRPr>
           </a:p>
@@ -16195,7 +16219,7 @@
             <a:avLst/>
           </a:prstGeom>
           <a:solidFill>
-            <a:schemeClr val="bg2"/>
+            <a:srgbClr val="FFA62B"/>
           </a:solidFill>
           <a:ln>
             <a:noFill/>
@@ -16250,14 +16274,14 @@
         </p:nvSpPr>
         <p:spPr>
           <a:xfrm>
-            <a:off x="2260672" y="3149455"/>
+            <a:off x="2260672" y="3091557"/>
             <a:ext cx="4301796" cy="115796"/>
           </a:xfrm>
           <a:prstGeom prst="rect">
             <a:avLst/>
           </a:prstGeom>
           <a:solidFill>
-            <a:schemeClr val="tx2"/>
+            <a:srgbClr val="024964"/>
           </a:solidFill>
           <a:ln>
             <a:noFill/>
@@ -16286,9 +16310,9 @@
               <a:buFont typeface="Arial"/>
               <a:buNone/>
             </a:pPr>
-            <a:endParaRPr sz="1400" b="0" i="0" u="none" strike="noStrike" cap="none">
+            <a:endParaRPr sz="1400" b="0" i="0" u="none" strike="noStrike" cap="none" dirty="0">
               <a:solidFill>
-                <a:srgbClr val="000000"/>
+                <a:srgbClr val="024964"/>
               </a:solidFill>
               <a:latin typeface="Arial"/>
               <a:ea typeface="Arial"/>
@@ -16371,14 +16395,18 @@
               <a:buNone/>
             </a:pPr>
             <a:r>
-              <a:rPr lang="en-US">
+              <a:rPr lang="en-US" dirty="0">
                 <a:solidFill>
-                  <a:schemeClr val="lt2"/>
+                  <a:srgbClr val="024964"/>
                 </a:solidFill>
               </a:rPr>
               <a:t>Motivation</a:t>
             </a:r>
-            <a:endParaRPr/>
+            <a:endParaRPr dirty="0">
+              <a:solidFill>
+                <a:srgbClr val="024964"/>
+              </a:solidFill>
+            </a:endParaRPr>
           </a:p>
         </p:txBody>
       </p:sp>
@@ -16425,7 +16453,7 @@
               <a:buNone/>
             </a:pPr>
             <a:r>
-              <a:rPr lang="en-US">
+              <a:rPr lang="en-US" dirty="0">
                 <a:solidFill>
                   <a:schemeClr val="dk1"/>
                 </a:solidFill>
@@ -16436,7 +16464,7 @@
               </a:rPr>
               <a:t>Faculty and administrators spend significant time on repetitive academic tasks such as:</a:t>
             </a:r>
-            <a:endParaRPr/>
+            <a:endParaRPr dirty="0"/>
           </a:p>
           <a:p>
             <a:pPr marL="914400" lvl="1" indent="-317500" algn="l" rtl="0">
@@ -16457,7 +16485,7 @@
               <a:buChar char="o"/>
             </a:pPr>
             <a:r>
-              <a:rPr lang="en-US" sz="1200">
+              <a:rPr lang="en-US" sz="1200" dirty="0">
                 <a:solidFill>
                   <a:schemeClr val="dk1"/>
                 </a:solidFill>
@@ -16468,7 +16496,7 @@
               </a:rPr>
               <a:t>Preparing Course Assessment Reports (CAR)</a:t>
             </a:r>
-            <a:endParaRPr/>
+            <a:endParaRPr dirty="0"/>
           </a:p>
           <a:p>
             <a:pPr marL="914400" lvl="1" indent="-317500" algn="l" rtl="0">
@@ -16489,7 +16517,7 @@
               <a:buChar char="o"/>
             </a:pPr>
             <a:r>
-              <a:rPr lang="en-US" sz="1200">
+              <a:rPr lang="en-US" sz="1200" dirty="0">
                 <a:solidFill>
                   <a:schemeClr val="dk1"/>
                 </a:solidFill>
@@ -16500,7 +16528,7 @@
               </a:rPr>
               <a:t>Extracting and analyzing student grade statistics</a:t>
             </a:r>
-            <a:endParaRPr/>
+            <a:endParaRPr dirty="0"/>
           </a:p>
           <a:p>
             <a:pPr marL="914400" lvl="1" indent="-317500" algn="l" rtl="0">
@@ -16521,7 +16549,7 @@
               <a:buChar char="o"/>
             </a:pPr>
             <a:r>
-              <a:rPr lang="en-US" sz="1200">
+              <a:rPr lang="en-US" sz="1200" dirty="0">
                 <a:solidFill>
                   <a:schemeClr val="dk1"/>
                 </a:solidFill>
@@ -16532,7 +16560,7 @@
               </a:rPr>
               <a:t>Preparing course peer-review reports.  </a:t>
             </a:r>
-            <a:endParaRPr/>
+            <a:endParaRPr dirty="0"/>
           </a:p>
           <a:p>
             <a:pPr marL="139700" lvl="0" indent="0" algn="l" rtl="0">
@@ -16549,7 +16577,7 @@
               <a:buNone/>
             </a:pPr>
             <a:r>
-              <a:rPr lang="en-US">
+              <a:rPr lang="en-US" dirty="0">
                 <a:solidFill>
                   <a:schemeClr val="dk1"/>
                 </a:solidFill>
@@ -16560,7 +16588,7 @@
               </a:rPr>
               <a:t>Because these tasks are done manually, they reduce valuable time for teaching and research. CourseGenie+ streamlines these processes through automation and centralized dashboards, improving efficiency across the academic workflow.</a:t>
             </a:r>
-            <a:endParaRPr>
+            <a:endParaRPr dirty="0">
               <a:solidFill>
                 <a:schemeClr val="dk1"/>
               </a:solidFill>
@@ -16698,14 +16726,30 @@
             <a:r>
               <a:rPr lang="en-US" dirty="0">
                 <a:solidFill>
+                  <a:srgbClr val="024964"/>
+                </a:solidFill>
+              </a:rPr>
+              <a:t>User Stories </a:t>
+            </a:r>
+            <a:r>
+              <a:rPr lang="en-US" dirty="0">
+                <a:solidFill>
                   <a:schemeClr val="lt2"/>
                 </a:solidFill>
               </a:rPr>
-              <a:t>User Stories - Professor Features</a:t>
+              <a:t>- </a:t>
+            </a:r>
+            <a:r>
+              <a:rPr lang="en-US" dirty="0">
+                <a:solidFill>
+                  <a:srgbClr val="024964"/>
+                </a:solidFill>
+              </a:rPr>
+              <a:t>Professor Features</a:t>
             </a:r>
             <a:endParaRPr dirty="0">
               <a:solidFill>
-                <a:schemeClr val="lt2"/>
+                <a:srgbClr val="024964"/>
               </a:solidFill>
             </a:endParaRPr>
           </a:p>
@@ -18164,14 +18208,14 @@
             <a:r>
               <a:rPr lang="en-US" dirty="0">
                 <a:solidFill>
-                  <a:schemeClr val="lt2"/>
+                  <a:srgbClr val="024964"/>
                 </a:solidFill>
               </a:rPr>
               <a:t>User Stories - Administrator Features</a:t>
             </a:r>
             <a:endParaRPr dirty="0">
               <a:solidFill>
-                <a:schemeClr val="lt2"/>
+                <a:srgbClr val="024964"/>
               </a:solidFill>
             </a:endParaRPr>
           </a:p>
@@ -19275,14 +19319,14 @@
             <a:r>
               <a:rPr lang="en-US" dirty="0">
                 <a:solidFill>
-                  <a:schemeClr val="lt2"/>
+                  <a:srgbClr val="024964"/>
                 </a:solidFill>
               </a:rPr>
               <a:t>User Stories - Reviewer &amp; Reviewee Features</a:t>
             </a:r>
             <a:endParaRPr dirty="0">
               <a:solidFill>
-                <a:schemeClr val="lt2"/>
+                <a:srgbClr val="024964"/>
               </a:solidFill>
             </a:endParaRPr>
           </a:p>
@@ -20254,16 +20298,16 @@
               <a:buNone/>
             </a:pPr>
             <a:r>
-              <a:rPr lang="en-US">
+              <a:rPr lang="en-US" dirty="0">
                 <a:solidFill>
-                  <a:schemeClr val="lt2"/>
+                  <a:srgbClr val="024964"/>
                 </a:solidFill>
               </a:rPr>
               <a:t>Use Case: UC01 - User Login &amp; Dashboard Selection</a:t>
             </a:r>
-            <a:endParaRPr>
+            <a:endParaRPr dirty="0">
               <a:solidFill>
-                <a:schemeClr val="lt2"/>
+                <a:srgbClr val="024964"/>
               </a:solidFill>
             </a:endParaRPr>
           </a:p>
@@ -21095,16 +21139,16 @@
               <a:buNone/>
             </a:pPr>
             <a:r>
-              <a:rPr lang="en-US">
+              <a:rPr lang="en-US" dirty="0">
                 <a:solidFill>
-                  <a:schemeClr val="lt2"/>
+                  <a:srgbClr val="024964"/>
                 </a:solidFill>
               </a:rPr>
               <a:t>Use Case: UC02 - CAR Preview &amp; Submission</a:t>
             </a:r>
-            <a:endParaRPr>
+            <a:endParaRPr dirty="0">
               <a:solidFill>
-                <a:schemeClr val="lt2"/>
+                <a:srgbClr val="024964"/>
               </a:solidFill>
             </a:endParaRPr>
           </a:p>
@@ -21904,16 +21948,16 @@
               <a:buNone/>
             </a:pPr>
             <a:r>
-              <a:rPr lang="en-US">
+              <a:rPr lang="en-US" dirty="0">
                 <a:solidFill>
-                  <a:schemeClr val="lt2"/>
+                  <a:srgbClr val="024964"/>
                 </a:solidFill>
               </a:rPr>
               <a:t>Use Case Diagram</a:t>
             </a:r>
-            <a:endParaRPr>
+            <a:endParaRPr dirty="0">
               <a:solidFill>
-                <a:schemeClr val="lt2"/>
+                <a:srgbClr val="024964"/>
               </a:solidFill>
             </a:endParaRPr>
           </a:p>
@@ -22132,16 +22176,16 @@
               <a:buNone/>
             </a:pPr>
             <a:r>
-              <a:rPr lang="en-US">
+              <a:rPr lang="en-US" dirty="0">
                 <a:solidFill>
-                  <a:schemeClr val="lt2"/>
+                  <a:srgbClr val="024964"/>
                 </a:solidFill>
               </a:rPr>
               <a:t>Work Breakdown Structure (WBS)</a:t>
             </a:r>
-            <a:endParaRPr>
+            <a:endParaRPr dirty="0">
               <a:solidFill>
-                <a:schemeClr val="lt2"/>
+                <a:srgbClr val="024964"/>
               </a:solidFill>
             </a:endParaRPr>
           </a:p>

</xml_diff>